<commit_message>
Connect to database and initial analysis.
</commit_message>
<xml_diff>
--- a/presentation/Product review analysis.pptx
+++ b/presentation/Product review analysis.pptx
@@ -8,7 +8,9 @@
     <p:sldId id="256" r:id="rId2"/>
     <p:sldId id="257" r:id="rId3"/>
     <p:sldId id="258" r:id="rId4"/>
-    <p:sldId id="259" r:id="rId5"/>
+    <p:sldId id="262" r:id="rId5"/>
+    <p:sldId id="263" r:id="rId6"/>
+    <p:sldId id="259" r:id="rId7"/>
   </p:sldIdLst>
   <p:sldSz cx="12192000" cy="6858000"/>
   <p:notesSz cx="6858000" cy="9144000"/>
@@ -121,6 +123,12 @@
             <p14:sldId id="258"/>
           </p14:sldIdLst>
         </p14:section>
+        <p14:section name="Questions" id="{7CC82DCD-DF74-433A-BE87-8D5BF39FE32A}">
+          <p14:sldIdLst>
+            <p14:sldId id="262"/>
+            <p14:sldId id="263"/>
+          </p14:sldIdLst>
+        </p14:section>
         <p14:section name="Technical design choice" id="{E9A13B69-8630-4561-BE0C-127A8A63608C}">
           <p14:sldIdLst>
             <p14:sldId id="259"/>
@@ -266,7 +274,7 @@
           <a:p>
             <a:fld id="{8ED3A66F-EF0C-4060-95B3-50E7476DC954}" type="datetimeFigureOut">
               <a:rPr lang="nl-NL" smtClean="0"/>
-              <a:t>7-9-2017</a:t>
+              <a:t>9-9-2017</a:t>
             </a:fld>
             <a:endParaRPr lang="nl-NL"/>
           </a:p>
@@ -436,7 +444,7 @@
           <a:p>
             <a:fld id="{8ED3A66F-EF0C-4060-95B3-50E7476DC954}" type="datetimeFigureOut">
               <a:rPr lang="nl-NL" smtClean="0"/>
-              <a:t>7-9-2017</a:t>
+              <a:t>9-9-2017</a:t>
             </a:fld>
             <a:endParaRPr lang="nl-NL"/>
           </a:p>
@@ -616,7 +624,7 @@
           <a:p>
             <a:fld id="{8ED3A66F-EF0C-4060-95B3-50E7476DC954}" type="datetimeFigureOut">
               <a:rPr lang="nl-NL" smtClean="0"/>
-              <a:t>7-9-2017</a:t>
+              <a:t>9-9-2017</a:t>
             </a:fld>
             <a:endParaRPr lang="nl-NL"/>
           </a:p>
@@ -786,7 +794,7 @@
           <a:p>
             <a:fld id="{8ED3A66F-EF0C-4060-95B3-50E7476DC954}" type="datetimeFigureOut">
               <a:rPr lang="nl-NL" smtClean="0"/>
-              <a:t>7-9-2017</a:t>
+              <a:t>9-9-2017</a:t>
             </a:fld>
             <a:endParaRPr lang="nl-NL"/>
           </a:p>
@@ -1032,7 +1040,7 @@
           <a:p>
             <a:fld id="{8ED3A66F-EF0C-4060-95B3-50E7476DC954}" type="datetimeFigureOut">
               <a:rPr lang="nl-NL" smtClean="0"/>
-              <a:t>7-9-2017</a:t>
+              <a:t>9-9-2017</a:t>
             </a:fld>
             <a:endParaRPr lang="nl-NL"/>
           </a:p>
@@ -1264,7 +1272,7 @@
           <a:p>
             <a:fld id="{8ED3A66F-EF0C-4060-95B3-50E7476DC954}" type="datetimeFigureOut">
               <a:rPr lang="nl-NL" smtClean="0"/>
-              <a:t>7-9-2017</a:t>
+              <a:t>9-9-2017</a:t>
             </a:fld>
             <a:endParaRPr lang="nl-NL"/>
           </a:p>
@@ -1631,7 +1639,7 @@
           <a:p>
             <a:fld id="{8ED3A66F-EF0C-4060-95B3-50E7476DC954}" type="datetimeFigureOut">
               <a:rPr lang="nl-NL" smtClean="0"/>
-              <a:t>7-9-2017</a:t>
+              <a:t>9-9-2017</a:t>
             </a:fld>
             <a:endParaRPr lang="nl-NL"/>
           </a:p>
@@ -1749,7 +1757,7 @@
           <a:p>
             <a:fld id="{8ED3A66F-EF0C-4060-95B3-50E7476DC954}" type="datetimeFigureOut">
               <a:rPr lang="nl-NL" smtClean="0"/>
-              <a:t>7-9-2017</a:t>
+              <a:t>9-9-2017</a:t>
             </a:fld>
             <a:endParaRPr lang="nl-NL"/>
           </a:p>
@@ -1844,7 +1852,7 @@
           <a:p>
             <a:fld id="{8ED3A66F-EF0C-4060-95B3-50E7476DC954}" type="datetimeFigureOut">
               <a:rPr lang="nl-NL" smtClean="0"/>
-              <a:t>7-9-2017</a:t>
+              <a:t>9-9-2017</a:t>
             </a:fld>
             <a:endParaRPr lang="nl-NL"/>
           </a:p>
@@ -2121,7 +2129,7 @@
           <a:p>
             <a:fld id="{8ED3A66F-EF0C-4060-95B3-50E7476DC954}" type="datetimeFigureOut">
               <a:rPr lang="nl-NL" smtClean="0"/>
-              <a:t>7-9-2017</a:t>
+              <a:t>9-9-2017</a:t>
             </a:fld>
             <a:endParaRPr lang="nl-NL"/>
           </a:p>
@@ -2374,7 +2382,7 @@
           <a:p>
             <a:fld id="{8ED3A66F-EF0C-4060-95B3-50E7476DC954}" type="datetimeFigureOut">
               <a:rPr lang="nl-NL" smtClean="0"/>
-              <a:t>7-9-2017</a:t>
+              <a:t>9-9-2017</a:t>
             </a:fld>
             <a:endParaRPr lang="nl-NL"/>
           </a:p>
@@ -2587,7 +2595,7 @@
           <a:p>
             <a:fld id="{8ED3A66F-EF0C-4060-95B3-50E7476DC954}" type="datetimeFigureOut">
               <a:rPr lang="nl-NL" smtClean="0"/>
-              <a:t>7-9-2017</a:t>
+              <a:t>9-9-2017</a:t>
             </a:fld>
             <a:endParaRPr lang="nl-NL"/>
           </a:p>
@@ -3420,7 +3428,7 @@
             <p:ph idx="1"/>
             <p:extLst>
               <p:ext uri="{D42A27DB-BD31-4B8C-83A1-F6EECF244321}">
-                <p14:modId xmlns:p14="http://schemas.microsoft.com/office/powerpoint/2010/main" val="3770208108"/>
+                <p14:modId xmlns:p14="http://schemas.microsoft.com/office/powerpoint/2010/main" val="3698093441"/>
               </p:ext>
             </p:extLst>
           </p:nvPr>
@@ -3436,8 +3444,9 @@
                 <a:tableStyleId>{69012ECD-51FC-41F1-AA8D-1B2483CD663E}</a:tableStyleId>
               </a:tblPr>
               <a:tblGrid>
-                <a:gridCol w="5257800"/>
-                <a:gridCol w="5257800"/>
+                <a:gridCol w="5978979"/>
+                <a:gridCol w="2310492"/>
+                <a:gridCol w="2226129"/>
               </a:tblGrid>
               <a:tr h="370840">
                 <a:tc>
@@ -3462,6 +3471,20 @@
                       <a:r>
                         <a:rPr lang="en-US" sz="1200" dirty="0" smtClean="0"/>
                         <a:t>Dataset</a:t>
+                      </a:r>
+                      <a:endParaRPr lang="nl-NL" sz="1200" dirty="0"/>
+                    </a:p>
+                  </a:txBody>
+                  <a:tcPr/>
+                </a:tc>
+                <a:tc>
+                  <a:txBody>
+                    <a:bodyPr/>
+                    <a:lstStyle/>
+                    <a:p>
+                      <a:r>
+                        <a:rPr lang="en-US" sz="1200" dirty="0" smtClean="0"/>
+                        <a:t>Check</a:t>
                       </a:r>
                       <a:endParaRPr lang="nl-NL" sz="1200" dirty="0"/>
                     </a:p>
@@ -3497,6 +3520,16 @@
                   </a:txBody>
                   <a:tcPr/>
                 </a:tc>
+                <a:tc>
+                  <a:txBody>
+                    <a:bodyPr/>
+                    <a:lstStyle/>
+                    <a:p>
+                      <a:endParaRPr lang="nl-NL" sz="1200" dirty="0"/>
+                    </a:p>
+                  </a:txBody>
+                  <a:tcPr/>
+                </a:tc>
               </a:tr>
               <a:tr h="370840">
                 <a:tc>
@@ -3520,6 +3553,20 @@
                       <a:r>
                         <a:rPr lang="en-US" sz="1200" dirty="0" smtClean="0"/>
                         <a:t>Review</a:t>
+                      </a:r>
+                      <a:endParaRPr lang="nl-NL" sz="1200" dirty="0"/>
+                    </a:p>
+                  </a:txBody>
+                  <a:tcPr/>
+                </a:tc>
+                <a:tc>
+                  <a:txBody>
+                    <a:bodyPr/>
+                    <a:lstStyle/>
+                    <a:p>
+                      <a:r>
+                        <a:rPr lang="en-US" sz="1200" dirty="0" smtClean="0"/>
+                        <a:t>Yes</a:t>
                       </a:r>
                       <a:endParaRPr lang="nl-NL" sz="1200" dirty="0"/>
                     </a:p>
@@ -3555,6 +3602,16 @@
                   </a:txBody>
                   <a:tcPr/>
                 </a:tc>
+                <a:tc>
+                  <a:txBody>
+                    <a:bodyPr/>
+                    <a:lstStyle/>
+                    <a:p>
+                      <a:endParaRPr lang="nl-NL" sz="1200" dirty="0"/>
+                    </a:p>
+                  </a:txBody>
+                  <a:tcPr/>
+                </a:tc>
               </a:tr>
               <a:tr h="370840">
                 <a:tc>
@@ -3585,6 +3642,20 @@
                   </a:txBody>
                   <a:tcPr/>
                 </a:tc>
+                <a:tc>
+                  <a:txBody>
+                    <a:bodyPr/>
+                    <a:lstStyle/>
+                    <a:p>
+                      <a:r>
+                        <a:rPr lang="en-US" sz="1200" dirty="0" smtClean="0"/>
+                        <a:t>Yes</a:t>
+                      </a:r>
+                      <a:endParaRPr lang="nl-NL" sz="1200" dirty="0"/>
+                    </a:p>
+                  </a:txBody>
+                  <a:tcPr/>
+                </a:tc>
               </a:tr>
               <a:tr h="370840">
                 <a:tc>
@@ -3596,6 +3667,16 @@
                         <a:rPr lang="en-US" sz="1200" dirty="0" smtClean="0"/>
                         <a:t>Optional - any other hypothesis you think is interesting, as long it would have business value for Amazon</a:t>
                       </a:r>
+                      <a:endParaRPr lang="nl-NL" sz="1200" dirty="0"/>
+                    </a:p>
+                  </a:txBody>
+                  <a:tcPr/>
+                </a:tc>
+                <a:tc>
+                  <a:txBody>
+                    <a:bodyPr/>
+                    <a:lstStyle/>
+                    <a:p>
                       <a:endParaRPr lang="nl-NL" sz="1200" dirty="0"/>
                     </a:p>
                   </a:txBody>
@@ -3630,6 +3711,197 @@
 </file>
 
 <file path=ppt/slides/slide4.xml><?xml version="1.0" encoding="utf-8"?>
+<p:sld xmlns:a="http://schemas.openxmlformats.org/drawingml/2006/main" xmlns:r="http://schemas.openxmlformats.org/officeDocument/2006/relationships" xmlns:p="http://schemas.openxmlformats.org/presentationml/2006/main">
+  <p:cSld>
+    <p:spTree>
+      <p:nvGrpSpPr>
+        <p:cNvPr id="1" name=""/>
+        <p:cNvGrpSpPr/>
+        <p:nvPr/>
+      </p:nvGrpSpPr>
+      <p:grpSpPr>
+        <a:xfrm>
+          <a:off x="0" y="0"/>
+          <a:ext cx="0" cy="0"/>
+          <a:chOff x="0" y="0"/>
+          <a:chExt cx="0" cy="0"/>
+        </a:xfrm>
+      </p:grpSpPr>
+      <p:sp>
+        <p:nvSpPr>
+          <p:cNvPr id="2" name="Title 1"/>
+          <p:cNvSpPr>
+            <a:spLocks noGrp="1"/>
+          </p:cNvSpPr>
+          <p:nvPr>
+            <p:ph type="title"/>
+          </p:nvPr>
+        </p:nvSpPr>
+        <p:spPr/>
+        <p:txBody>
+          <a:bodyPr/>
+          <a:lstStyle/>
+          <a:p>
+            <a:r>
+              <a:rPr lang="en-US" dirty="0" smtClean="0"/>
+              <a:t>Relationship between review and price</a:t>
+            </a:r>
+            <a:endParaRPr lang="nl-NL" dirty="0"/>
+          </a:p>
+        </p:txBody>
+      </p:sp>
+      <p:sp>
+        <p:nvSpPr>
+          <p:cNvPr id="3" name="Content Placeholder 2"/>
+          <p:cNvSpPr>
+            <a:spLocks noGrp="1"/>
+          </p:cNvSpPr>
+          <p:nvPr>
+            <p:ph idx="1"/>
+          </p:nvPr>
+        </p:nvSpPr>
+        <p:spPr/>
+        <p:txBody>
+          <a:bodyPr>
+            <a:normAutofit/>
+          </a:bodyPr>
+          <a:lstStyle/>
+          <a:p>
+            <a:r>
+              <a:rPr lang="en-US" sz="1400" dirty="0" smtClean="0"/>
+              <a:t>Higher price leads </a:t>
+            </a:r>
+            <a:r>
+              <a:rPr lang="en-US" sz="1400" smtClean="0"/>
+              <a:t>to higher </a:t>
+            </a:r>
+            <a:r>
+              <a:rPr lang="en-US" sz="1400" dirty="0" smtClean="0"/>
+              <a:t>rating?</a:t>
+            </a:r>
+          </a:p>
+          <a:p>
+            <a:pPr lvl="1"/>
+            <a:r>
+              <a:rPr lang="en-US" sz="1200" dirty="0" smtClean="0"/>
+              <a:t>Dataset size</a:t>
+            </a:r>
+          </a:p>
+          <a:p>
+            <a:pPr lvl="1"/>
+            <a:r>
+              <a:rPr lang="en-US" sz="1200" dirty="0" smtClean="0"/>
+              <a:t>Data structure (json)</a:t>
+            </a:r>
+          </a:p>
+          <a:p>
+            <a:pPr lvl="1"/>
+            <a:r>
+              <a:rPr lang="en-US" sz="1200" dirty="0" smtClean="0"/>
+              <a:t>Speed</a:t>
+            </a:r>
+          </a:p>
+          <a:p>
+            <a:pPr lvl="1"/>
+            <a:r>
+              <a:rPr lang="en-US" sz="1200" dirty="0" smtClean="0"/>
+              <a:t>Scalability</a:t>
+            </a:r>
+          </a:p>
+          <a:p>
+            <a:pPr lvl="1"/>
+            <a:endParaRPr lang="en-US" sz="1200" dirty="0" smtClean="0"/>
+          </a:p>
+          <a:p>
+            <a:pPr lvl="1"/>
+            <a:endParaRPr lang="nl-NL" sz="1200" dirty="0"/>
+          </a:p>
+        </p:txBody>
+      </p:sp>
+    </p:spTree>
+    <p:extLst>
+      <p:ext uri="{BB962C8B-B14F-4D97-AF65-F5344CB8AC3E}">
+        <p14:creationId xmlns:p14="http://schemas.microsoft.com/office/powerpoint/2010/main" val="1562805421"/>
+      </p:ext>
+    </p:extLst>
+  </p:cSld>
+  <p:clrMapOvr>
+    <a:masterClrMapping/>
+  </p:clrMapOvr>
+</p:sld>
+</file>
+
+<file path=ppt/slides/slide5.xml><?xml version="1.0" encoding="utf-8"?>
+<p:sld xmlns:a="http://schemas.openxmlformats.org/drawingml/2006/main" xmlns:r="http://schemas.openxmlformats.org/officeDocument/2006/relationships" xmlns:p="http://schemas.openxmlformats.org/presentationml/2006/main">
+  <p:cSld>
+    <p:spTree>
+      <p:nvGrpSpPr>
+        <p:cNvPr id="1" name=""/>
+        <p:cNvGrpSpPr/>
+        <p:nvPr/>
+      </p:nvGrpSpPr>
+      <p:grpSpPr>
+        <a:xfrm>
+          <a:off x="0" y="0"/>
+          <a:ext cx="0" cy="0"/>
+          <a:chOff x="0" y="0"/>
+          <a:chExt cx="0" cy="0"/>
+        </a:xfrm>
+      </p:grpSpPr>
+      <p:sp>
+        <p:nvSpPr>
+          <p:cNvPr id="2" name="Title 1"/>
+          <p:cNvSpPr>
+            <a:spLocks noGrp="1"/>
+          </p:cNvSpPr>
+          <p:nvPr>
+            <p:ph type="title"/>
+          </p:nvPr>
+        </p:nvSpPr>
+        <p:spPr/>
+        <p:txBody>
+          <a:bodyPr/>
+          <a:lstStyle/>
+          <a:p>
+            <a:endParaRPr lang="nl-NL" dirty="0"/>
+          </a:p>
+        </p:txBody>
+      </p:sp>
+      <p:sp>
+        <p:nvSpPr>
+          <p:cNvPr id="3" name="Content Placeholder 2"/>
+          <p:cNvSpPr>
+            <a:spLocks noGrp="1"/>
+          </p:cNvSpPr>
+          <p:nvPr>
+            <p:ph idx="1"/>
+          </p:nvPr>
+        </p:nvSpPr>
+        <p:spPr/>
+        <p:txBody>
+          <a:bodyPr>
+            <a:normAutofit/>
+          </a:bodyPr>
+          <a:lstStyle/>
+          <a:p>
+            <a:endParaRPr lang="nl-NL" sz="1600" dirty="0"/>
+          </a:p>
+        </p:txBody>
+      </p:sp>
+    </p:spTree>
+    <p:extLst>
+      <p:ext uri="{BB962C8B-B14F-4D97-AF65-F5344CB8AC3E}">
+        <p14:creationId xmlns:p14="http://schemas.microsoft.com/office/powerpoint/2010/main" val="2879637664"/>
+      </p:ext>
+    </p:extLst>
+  </p:cSld>
+  <p:clrMapOvr>
+    <a:masterClrMapping/>
+  </p:clrMapOvr>
+</p:sld>
+</file>
+
+<file path=ppt/slides/slide6.xml><?xml version="1.0" encoding="utf-8"?>
 <p:sld xmlns:a="http://schemas.openxmlformats.org/drawingml/2006/main" xmlns:r="http://schemas.openxmlformats.org/officeDocument/2006/relationships" xmlns:p="http://schemas.openxmlformats.org/presentationml/2006/main">
   <p:cSld>
     <p:spTree>

</xml_diff>

<commit_message>
Updated with helpfulness analysis.
</commit_message>
<xml_diff>
--- a/presentation/Product review analysis.pptx
+++ b/presentation/Product review analysis.pptx
@@ -8,9 +8,10 @@
     <p:sldId id="256" r:id="rId2"/>
     <p:sldId id="257" r:id="rId3"/>
     <p:sldId id="258" r:id="rId4"/>
-    <p:sldId id="262" r:id="rId5"/>
-    <p:sldId id="263" r:id="rId6"/>
-    <p:sldId id="259" r:id="rId7"/>
+    <p:sldId id="264" r:id="rId5"/>
+    <p:sldId id="262" r:id="rId6"/>
+    <p:sldId id="263" r:id="rId7"/>
+    <p:sldId id="259" r:id="rId8"/>
   </p:sldIdLst>
   <p:sldSz cx="12192000" cy="6858000"/>
   <p:notesSz cx="6858000" cy="9144000"/>
@@ -121,9 +122,10 @@
           <p14:sldIdLst>
             <p14:sldId id="257"/>
             <p14:sldId id="258"/>
+            <p14:sldId id="264"/>
           </p14:sldIdLst>
         </p14:section>
-        <p14:section name="Questions" id="{7CC82DCD-DF74-433A-BE87-8D5BF39FE32A}">
+        <p14:section name="Analysis" id="{7CC82DCD-DF74-433A-BE87-8D5BF39FE32A}">
           <p14:sldIdLst>
             <p14:sldId id="262"/>
             <p14:sldId id="263"/>
@@ -274,7 +276,7 @@
           <a:p>
             <a:fld id="{8ED3A66F-EF0C-4060-95B3-50E7476DC954}" type="datetimeFigureOut">
               <a:rPr lang="nl-NL" smtClean="0"/>
-              <a:t>9-9-2017</a:t>
+              <a:t>10-9-2017</a:t>
             </a:fld>
             <a:endParaRPr lang="nl-NL"/>
           </a:p>
@@ -444,7 +446,7 @@
           <a:p>
             <a:fld id="{8ED3A66F-EF0C-4060-95B3-50E7476DC954}" type="datetimeFigureOut">
               <a:rPr lang="nl-NL" smtClean="0"/>
-              <a:t>9-9-2017</a:t>
+              <a:t>10-9-2017</a:t>
             </a:fld>
             <a:endParaRPr lang="nl-NL"/>
           </a:p>
@@ -624,7 +626,7 @@
           <a:p>
             <a:fld id="{8ED3A66F-EF0C-4060-95B3-50E7476DC954}" type="datetimeFigureOut">
               <a:rPr lang="nl-NL" smtClean="0"/>
-              <a:t>9-9-2017</a:t>
+              <a:t>10-9-2017</a:t>
             </a:fld>
             <a:endParaRPr lang="nl-NL"/>
           </a:p>
@@ -794,7 +796,7 @@
           <a:p>
             <a:fld id="{8ED3A66F-EF0C-4060-95B3-50E7476DC954}" type="datetimeFigureOut">
               <a:rPr lang="nl-NL" smtClean="0"/>
-              <a:t>9-9-2017</a:t>
+              <a:t>10-9-2017</a:t>
             </a:fld>
             <a:endParaRPr lang="nl-NL"/>
           </a:p>
@@ -1040,7 +1042,7 @@
           <a:p>
             <a:fld id="{8ED3A66F-EF0C-4060-95B3-50E7476DC954}" type="datetimeFigureOut">
               <a:rPr lang="nl-NL" smtClean="0"/>
-              <a:t>9-9-2017</a:t>
+              <a:t>10-9-2017</a:t>
             </a:fld>
             <a:endParaRPr lang="nl-NL"/>
           </a:p>
@@ -1272,7 +1274,7 @@
           <a:p>
             <a:fld id="{8ED3A66F-EF0C-4060-95B3-50E7476DC954}" type="datetimeFigureOut">
               <a:rPr lang="nl-NL" smtClean="0"/>
-              <a:t>9-9-2017</a:t>
+              <a:t>10-9-2017</a:t>
             </a:fld>
             <a:endParaRPr lang="nl-NL"/>
           </a:p>
@@ -1639,7 +1641,7 @@
           <a:p>
             <a:fld id="{8ED3A66F-EF0C-4060-95B3-50E7476DC954}" type="datetimeFigureOut">
               <a:rPr lang="nl-NL" smtClean="0"/>
-              <a:t>9-9-2017</a:t>
+              <a:t>10-9-2017</a:t>
             </a:fld>
             <a:endParaRPr lang="nl-NL"/>
           </a:p>
@@ -1757,7 +1759,7 @@
           <a:p>
             <a:fld id="{8ED3A66F-EF0C-4060-95B3-50E7476DC954}" type="datetimeFigureOut">
               <a:rPr lang="nl-NL" smtClean="0"/>
-              <a:t>9-9-2017</a:t>
+              <a:t>10-9-2017</a:t>
             </a:fld>
             <a:endParaRPr lang="nl-NL"/>
           </a:p>
@@ -1852,7 +1854,7 @@
           <a:p>
             <a:fld id="{8ED3A66F-EF0C-4060-95B3-50E7476DC954}" type="datetimeFigureOut">
               <a:rPr lang="nl-NL" smtClean="0"/>
-              <a:t>9-9-2017</a:t>
+              <a:t>10-9-2017</a:t>
             </a:fld>
             <a:endParaRPr lang="nl-NL"/>
           </a:p>
@@ -2129,7 +2131,7 @@
           <a:p>
             <a:fld id="{8ED3A66F-EF0C-4060-95B3-50E7476DC954}" type="datetimeFigureOut">
               <a:rPr lang="nl-NL" smtClean="0"/>
-              <a:t>9-9-2017</a:t>
+              <a:t>10-9-2017</a:t>
             </a:fld>
             <a:endParaRPr lang="nl-NL"/>
           </a:p>
@@ -2382,7 +2384,7 @@
           <a:p>
             <a:fld id="{8ED3A66F-EF0C-4060-95B3-50E7476DC954}" type="datetimeFigureOut">
               <a:rPr lang="nl-NL" smtClean="0"/>
-              <a:t>9-9-2017</a:t>
+              <a:t>10-9-2017</a:t>
             </a:fld>
             <a:endParaRPr lang="nl-NL"/>
           </a:p>
@@ -2595,7 +2597,7 @@
           <a:p>
             <a:fld id="{8ED3A66F-EF0C-4060-95B3-50E7476DC954}" type="datetimeFigureOut">
               <a:rPr lang="nl-NL" smtClean="0"/>
-              <a:t>9-9-2017</a:t>
+              <a:t>10-9-2017</a:t>
             </a:fld>
             <a:endParaRPr lang="nl-NL"/>
           </a:p>
@@ -2986,6 +2988,16 @@
 <file path=ppt/slides/slide1.xml><?xml version="1.0" encoding="utf-8"?>
 <p:sld xmlns:a="http://schemas.openxmlformats.org/drawingml/2006/main" xmlns:r="http://schemas.openxmlformats.org/officeDocument/2006/relationships" xmlns:p="http://schemas.openxmlformats.org/presentationml/2006/main">
   <p:cSld>
+    <p:bg>
+      <p:bgPr shadeToTitle="1">
+        <a:solidFill>
+          <a:srgbClr val="FF8000">
+            <a:alpha val="90000"/>
+          </a:srgbClr>
+        </a:solidFill>
+        <a:effectLst/>
+      </p:bgPr>
+    </p:bg>
     <p:spTree>
       <p:nvGrpSpPr>
         <p:cNvPr id="1" name=""/>
@@ -3012,14 +3024,49 @@
         </p:nvSpPr>
         <p:spPr/>
         <p:txBody>
-          <a:bodyPr/>
-          <a:lstStyle/>
-          <a:p>
-            <a:r>
-              <a:rPr lang="en-US" dirty="0" smtClean="0"/>
-              <a:t>Product review analysis</a:t>
-            </a:r>
-            <a:endParaRPr lang="nl-NL" dirty="0"/>
+          <a:bodyPr vert="horz" lIns="91440" tIns="45720" rIns="91440" bIns="45720" rtlCol="0" anchor="ctr">
+            <a:normAutofit/>
+          </a:bodyPr>
+          <a:lstStyle/>
+          <a:p>
+            <a:pPr algn="l"/>
+            <a:r>
+              <a:rPr lang="en-US" sz="4400" b="1" dirty="0" smtClean="0">
+                <a:solidFill>
+                  <a:schemeClr val="bg1"/>
+                </a:solidFill>
+                <a:latin typeface="Arial" panose="020B0604020202020204" pitchFamily="34" charset="0"/>
+                <a:cs typeface="Arial" panose="020B0604020202020204" pitchFamily="34" charset="0"/>
+              </a:rPr>
+              <a:t>Amazon product </a:t>
+            </a:r>
+            <a:r>
+              <a:rPr lang="en-US" sz="4400" b="1" dirty="0">
+                <a:solidFill>
+                  <a:schemeClr val="bg1"/>
+                </a:solidFill>
+                <a:latin typeface="Arial" panose="020B0604020202020204" pitchFamily="34" charset="0"/>
+                <a:cs typeface="Arial" panose="020B0604020202020204" pitchFamily="34" charset="0"/>
+              </a:rPr>
+              <a:t>review </a:t>
+            </a:r>
+            <a:r>
+              <a:rPr lang="en-US" sz="4400" b="1" dirty="0" smtClean="0">
+                <a:solidFill>
+                  <a:schemeClr val="bg1"/>
+                </a:solidFill>
+                <a:latin typeface="Arial" panose="020B0604020202020204" pitchFamily="34" charset="0"/>
+                <a:cs typeface="Arial" panose="020B0604020202020204" pitchFamily="34" charset="0"/>
+              </a:rPr>
+              <a:t>analysis</a:t>
+            </a:r>
+            <a:endParaRPr lang="nl-NL" sz="4400" b="1" dirty="0">
+              <a:solidFill>
+                <a:schemeClr val="bg1"/>
+              </a:solidFill>
+              <a:latin typeface="Arial" panose="020B0604020202020204" pitchFamily="34" charset="0"/>
+              <a:cs typeface="Arial" panose="020B0604020202020204" pitchFamily="34" charset="0"/>
+            </a:endParaRPr>
           </a:p>
         </p:txBody>
       </p:sp>
@@ -3035,13 +3082,80 @@
         </p:nvSpPr>
         <p:spPr/>
         <p:txBody>
-          <a:bodyPr/>
-          <a:lstStyle/>
-          <a:p>
-            <a:endParaRPr lang="nl-NL"/>
-          </a:p>
-        </p:txBody>
-      </p:sp>
+          <a:bodyPr>
+            <a:normAutofit/>
+          </a:bodyPr>
+          <a:lstStyle/>
+          <a:p>
+            <a:pPr algn="l"/>
+            <a:r>
+              <a:rPr lang="en-US" sz="1800" dirty="0" smtClean="0">
+                <a:solidFill>
+                  <a:schemeClr val="bg1"/>
+                </a:solidFill>
+                <a:latin typeface="Arial" panose="020B0604020202020204" pitchFamily="34" charset="0"/>
+                <a:cs typeface="Arial" panose="020B0604020202020204" pitchFamily="34" charset="0"/>
+              </a:rPr>
+              <a:t>Xin Pang</a:t>
+            </a:r>
+          </a:p>
+          <a:p>
+            <a:pPr algn="l"/>
+            <a:r>
+              <a:rPr lang="en-US" sz="1800" dirty="0" smtClean="0">
+                <a:solidFill>
+                  <a:schemeClr val="bg1"/>
+                </a:solidFill>
+                <a:latin typeface="Arial" panose="020B0604020202020204" pitchFamily="34" charset="0"/>
+                <a:cs typeface="Arial" panose="020B0604020202020204" pitchFamily="34" charset="0"/>
+              </a:rPr>
+              <a:t>9/10/2017</a:t>
+            </a:r>
+            <a:endParaRPr lang="nl-NL" sz="1800" dirty="0">
+              <a:solidFill>
+                <a:schemeClr val="bg1"/>
+              </a:solidFill>
+              <a:latin typeface="Arial" panose="020B0604020202020204" pitchFamily="34" charset="0"/>
+              <a:cs typeface="Arial" panose="020B0604020202020204" pitchFamily="34" charset="0"/>
+            </a:endParaRPr>
+          </a:p>
+        </p:txBody>
+      </p:sp>
+      <p:cxnSp>
+        <p:nvCxnSpPr>
+          <p:cNvPr id="5" name="Straight Connector 4"/>
+          <p:cNvCxnSpPr/>
+          <p:nvPr/>
+        </p:nvCxnSpPr>
+        <p:spPr>
+          <a:xfrm>
+            <a:off x="1601637" y="2872596"/>
+            <a:ext cx="1236453" cy="0"/>
+          </a:xfrm>
+          <a:prstGeom prst="line">
+            <a:avLst/>
+          </a:prstGeom>
+          <a:ln w="57150">
+            <a:solidFill>
+              <a:schemeClr val="bg1"/>
+            </a:solidFill>
+          </a:ln>
+        </p:spPr>
+        <p:style>
+          <a:lnRef idx="1">
+            <a:schemeClr val="accent1"/>
+          </a:lnRef>
+          <a:fillRef idx="0">
+            <a:schemeClr val="accent1"/>
+          </a:fillRef>
+          <a:effectRef idx="0">
+            <a:schemeClr val="accent1"/>
+          </a:effectRef>
+          <a:fontRef idx="minor">
+            <a:schemeClr val="tx1"/>
+          </a:fontRef>
+        </p:style>
+      </p:cxnSp>
     </p:spTree>
     <p:extLst>
       <p:ext uri="{BB962C8B-B14F-4D97-AF65-F5344CB8AC3E}">
@@ -3088,10 +3202,18 @@
           <a:lstStyle/>
           <a:p>
             <a:r>
-              <a:rPr lang="en-US" dirty="0" smtClean="0"/>
+              <a:rPr lang="en-US" dirty="0" smtClean="0">
+                <a:solidFill>
+                  <a:srgbClr val="FF8000"/>
+                </a:solidFill>
+              </a:rPr>
               <a:t>Data fields</a:t>
             </a:r>
-            <a:endParaRPr lang="nl-NL" dirty="0"/>
+            <a:endParaRPr lang="nl-NL" dirty="0">
+              <a:solidFill>
+                <a:srgbClr val="FF8000"/>
+              </a:solidFill>
+            </a:endParaRPr>
           </a:p>
         </p:txBody>
       </p:sp>
@@ -3411,10 +3533,18 @@
           <a:lstStyle/>
           <a:p>
             <a:r>
-              <a:rPr lang="en-US" dirty="0" smtClean="0"/>
+              <a:rPr lang="en-US" dirty="0" smtClean="0">
+                <a:solidFill>
+                  <a:srgbClr val="FF8000"/>
+                </a:solidFill>
+              </a:rPr>
               <a:t>List of questions</a:t>
             </a:r>
-            <a:endParaRPr lang="nl-NL" dirty="0"/>
+            <a:endParaRPr lang="nl-NL" dirty="0">
+              <a:solidFill>
+                <a:srgbClr val="FF8000"/>
+              </a:solidFill>
+            </a:endParaRPr>
           </a:p>
         </p:txBody>
       </p:sp>
@@ -3428,7 +3558,7 @@
             <p:ph idx="1"/>
             <p:extLst>
               <p:ext uri="{D42A27DB-BD31-4B8C-83A1-F6EECF244321}">
-                <p14:modId xmlns:p14="http://schemas.microsoft.com/office/powerpoint/2010/main" val="3698093441"/>
+                <p14:modId xmlns:p14="http://schemas.microsoft.com/office/powerpoint/2010/main" val="2091134731"/>
               </p:ext>
             </p:extLst>
           </p:nvPr>
@@ -3607,6 +3737,10 @@
                     <a:bodyPr/>
                     <a:lstStyle/>
                     <a:p>
+                      <a:r>
+                        <a:rPr lang="en-US" sz="1200" dirty="0" smtClean="0"/>
+                        <a:t>Yes</a:t>
+                      </a:r>
                       <a:endParaRPr lang="nl-NL" sz="1200" dirty="0"/>
                     </a:p>
                   </a:txBody>
@@ -3739,14 +3873,24 @@
         </p:nvSpPr>
         <p:spPr/>
         <p:txBody>
-          <a:bodyPr/>
-          <a:lstStyle/>
-          <a:p>
-            <a:r>
-              <a:rPr lang="en-US" dirty="0" smtClean="0"/>
-              <a:t>Relationship between review and price</a:t>
-            </a:r>
-            <a:endParaRPr lang="nl-NL" dirty="0"/>
+          <a:bodyPr vert="horz" lIns="91440" tIns="45720" rIns="91440" bIns="45720" rtlCol="0" anchor="ctr">
+            <a:normAutofit/>
+          </a:bodyPr>
+          <a:lstStyle/>
+          <a:p>
+            <a:r>
+              <a:rPr lang="en-US" dirty="0">
+                <a:solidFill>
+                  <a:srgbClr val="FF8000"/>
+                </a:solidFill>
+              </a:rPr>
+              <a:t>Recommendations</a:t>
+            </a:r>
+            <a:endParaRPr lang="nl-NL" dirty="0">
+              <a:solidFill>
+                <a:srgbClr val="FF8000"/>
+              </a:solidFill>
+            </a:endParaRPr>
           </a:p>
         </p:txBody>
       </p:sp>
@@ -3768,60 +3912,94 @@
           <a:lstStyle/>
           <a:p>
             <a:r>
+              <a:rPr lang="en-US" sz="1400" dirty="0"/>
+              <a:t>Organize </a:t>
+            </a:r>
+            <a:r>
               <a:rPr lang="en-US" sz="1400" dirty="0" smtClean="0"/>
-              <a:t>Higher price leads </a:t>
-            </a:r>
-            <a:r>
-              <a:rPr lang="en-US" sz="1400" smtClean="0"/>
-              <a:t>to higher </a:t>
+              <a:t>reviews: simplify </a:t>
+            </a:r>
+            <a:r>
+              <a:rPr lang="en-US" sz="1400" dirty="0"/>
+              <a:t>the process to find the reviews that matter most to consumers by organizing reviews and ratings into specific groups</a:t>
             </a:r>
             <a:r>
               <a:rPr lang="en-US" sz="1400" dirty="0" smtClean="0"/>
-              <a:t>rating?</a:t>
-            </a:r>
-          </a:p>
-          <a:p>
-            <a:pPr lvl="1"/>
-            <a:r>
-              <a:rPr lang="en-US" sz="1200" dirty="0" smtClean="0"/>
-              <a:t>Dataset size</a:t>
-            </a:r>
-          </a:p>
-          <a:p>
-            <a:pPr lvl="1"/>
-            <a:r>
-              <a:rPr lang="en-US" sz="1200" dirty="0" smtClean="0"/>
-              <a:t>Data structure (json)</a:t>
-            </a:r>
-          </a:p>
-          <a:p>
-            <a:pPr lvl="1"/>
-            <a:r>
-              <a:rPr lang="en-US" sz="1200" dirty="0" smtClean="0"/>
-              <a:t>Speed</a:t>
-            </a:r>
-          </a:p>
-          <a:p>
-            <a:pPr lvl="1"/>
-            <a:r>
-              <a:rPr lang="en-US" sz="1200" dirty="0" smtClean="0"/>
-              <a:t>Scalability</a:t>
-            </a:r>
-          </a:p>
-          <a:p>
-            <a:pPr lvl="1"/>
-            <a:endParaRPr lang="en-US" sz="1200" dirty="0" smtClean="0"/>
-          </a:p>
-          <a:p>
-            <a:pPr lvl="1"/>
-            <a:endParaRPr lang="nl-NL" sz="1200" dirty="0"/>
+              <a:t>.</a:t>
+            </a:r>
+          </a:p>
+          <a:p>
+            <a:r>
+              <a:rPr lang="en-US" sz="1400" dirty="0"/>
+              <a:t>You can help improve your merchandising and product selection to ensure that you have adequate inventory of highly reviewed products. You can remove poorly reviewed products, especially those that get the most negative reviews and complaints</a:t>
+            </a:r>
+            <a:r>
+              <a:rPr lang="en-US" sz="1400" dirty="0" smtClean="0"/>
+              <a:t>.</a:t>
+            </a:r>
+          </a:p>
+          <a:p>
+            <a:r>
+              <a:rPr lang="en-US" sz="1400" dirty="0"/>
+              <a:t>Provide top 10 lists of the products that received the best reviews accessible from your product category pages.</a:t>
+            </a:r>
+          </a:p>
+          <a:p>
+            <a:r>
+              <a:rPr lang="en-US" sz="1400" dirty="0" smtClean="0"/>
+              <a:t>If </a:t>
+            </a:r>
+            <a:r>
+              <a:rPr lang="en-US" sz="1400" dirty="0"/>
+              <a:t>your search system can allow it, include an option to search your products based on customer ranking or feedback.</a:t>
+            </a:r>
+          </a:p>
+          <a:p>
+            <a:r>
+              <a:rPr lang="en-US" sz="1400" dirty="0" smtClean="0"/>
+              <a:t>Launch marketing campaign based on the top reviewed and rated products.</a:t>
+            </a:r>
+          </a:p>
+          <a:p>
+            <a:r>
+              <a:rPr lang="en-US" sz="1400" dirty="0" smtClean="0"/>
+              <a:t>Why do we want users to write more and longer reviews?</a:t>
+            </a:r>
+          </a:p>
+          <a:p>
+            <a:pPr fontAlgn="base"/>
+            <a:r>
+              <a:rPr lang="en-US" sz="1400" dirty="0"/>
+              <a:t>There are two approximate patterns that can be observed here: the better a product is ranked, the more likely it would receive customer reviews, and top-ranked products usually would have high product ratings.</a:t>
+            </a:r>
+          </a:p>
+          <a:p>
+            <a:pPr fontAlgn="base"/>
+            <a:r>
+              <a:rPr lang="en-US" sz="1400" dirty="0"/>
+              <a:t>Considering that there was positive correlation observed between product rank and product rating, it can be inferred at this point that there might be some relation between customer reviews and the </a:t>
+            </a:r>
+            <a:r>
+              <a:rPr lang="en-US" sz="1400" dirty="0" err="1"/>
+              <a:t>the</a:t>
+            </a:r>
+            <a:r>
+              <a:rPr lang="en-US" sz="1400" dirty="0"/>
+              <a:t> product rating.</a:t>
+            </a:r>
+          </a:p>
+          <a:p>
+            <a:endParaRPr lang="en-US" sz="1400" dirty="0" smtClean="0"/>
+          </a:p>
+          <a:p>
+            <a:endParaRPr lang="nl-NL" sz="1400" dirty="0"/>
           </a:p>
         </p:txBody>
       </p:sp>
     </p:spTree>
     <p:extLst>
       <p:ext uri="{BB962C8B-B14F-4D97-AF65-F5344CB8AC3E}">
-        <p14:creationId xmlns:p14="http://schemas.microsoft.com/office/powerpoint/2010/main" val="1562805421"/>
+        <p14:creationId xmlns:p14="http://schemas.microsoft.com/office/powerpoint/2010/main" val="247289664"/>
       </p:ext>
     </p:extLst>
   </p:cSld>
@@ -3863,7 +4041,19 @@
           <a:bodyPr/>
           <a:lstStyle/>
           <a:p>
-            <a:endParaRPr lang="nl-NL" dirty="0"/>
+            <a:r>
+              <a:rPr lang="en-US" dirty="0" smtClean="0">
+                <a:solidFill>
+                  <a:srgbClr val="FF8000"/>
+                </a:solidFill>
+              </a:rPr>
+              <a:t>Relationship between review and price</a:t>
+            </a:r>
+            <a:endParaRPr lang="nl-NL" dirty="0">
+              <a:solidFill>
+                <a:srgbClr val="FF8000"/>
+              </a:solidFill>
+            </a:endParaRPr>
           </a:p>
         </p:txBody>
       </p:sp>
@@ -3884,14 +4074,27 @@
           </a:bodyPr>
           <a:lstStyle/>
           <a:p>
-            <a:endParaRPr lang="nl-NL" sz="1600" dirty="0"/>
+            <a:r>
+              <a:rPr lang="en-US" sz="1400" dirty="0" smtClean="0"/>
+              <a:t>Higher price leads to higher rating?</a:t>
+            </a:r>
+          </a:p>
+          <a:p>
+            <a:r>
+              <a:rPr lang="en-US" sz="1600" dirty="0" smtClean="0"/>
+              <a:t>Higher price leads to longer review text?</a:t>
+            </a:r>
+          </a:p>
+          <a:p>
+            <a:pPr lvl="1"/>
+            <a:endParaRPr lang="nl-NL" sz="1200" dirty="0"/>
           </a:p>
         </p:txBody>
       </p:sp>
     </p:spTree>
     <p:extLst>
       <p:ext uri="{BB962C8B-B14F-4D97-AF65-F5344CB8AC3E}">
-        <p14:creationId xmlns:p14="http://schemas.microsoft.com/office/powerpoint/2010/main" val="2879637664"/>
+        <p14:creationId xmlns:p14="http://schemas.microsoft.com/office/powerpoint/2010/main" val="1562805421"/>
       </p:ext>
     </p:extLst>
   </p:cSld>
@@ -3930,14 +4133,114 @@
         </p:nvSpPr>
         <p:spPr/>
         <p:txBody>
-          <a:bodyPr/>
-          <a:lstStyle/>
-          <a:p>
-            <a:r>
-              <a:rPr lang="en-US" dirty="0" smtClean="0"/>
+          <a:bodyPr vert="horz" lIns="91440" tIns="45720" rIns="91440" bIns="45720" rtlCol="0" anchor="ctr">
+            <a:normAutofit/>
+          </a:bodyPr>
+          <a:lstStyle/>
+          <a:p>
+            <a:r>
+              <a:rPr lang="en-US" dirty="0">
+                <a:solidFill>
+                  <a:srgbClr val="FF8000"/>
+                </a:solidFill>
+              </a:rPr>
+              <a:t>Review vs. helpfulness</a:t>
+            </a:r>
+            <a:endParaRPr lang="nl-NL" dirty="0">
+              <a:solidFill>
+                <a:srgbClr val="FF8000"/>
+              </a:solidFill>
+            </a:endParaRPr>
+          </a:p>
+        </p:txBody>
+      </p:sp>
+      <p:sp>
+        <p:nvSpPr>
+          <p:cNvPr id="3" name="Content Placeholder 2"/>
+          <p:cNvSpPr>
+            <a:spLocks noGrp="1"/>
+          </p:cNvSpPr>
+          <p:nvPr>
+            <p:ph idx="1"/>
+          </p:nvPr>
+        </p:nvSpPr>
+        <p:spPr/>
+        <p:txBody>
+          <a:bodyPr>
+            <a:normAutofit/>
+          </a:bodyPr>
+          <a:lstStyle/>
+          <a:p>
+            <a:r>
+              <a:rPr lang="en-US" sz="1600" dirty="0" smtClean="0"/>
+              <a:t>Hypothesis: people are more cautious about buying higher priced product, thus will read more reviews. We would expect more ‘helpful’ in the reviews.</a:t>
+            </a:r>
+          </a:p>
+          <a:p>
+            <a:endParaRPr lang="nl-NL" sz="1600" dirty="0"/>
+          </a:p>
+        </p:txBody>
+      </p:sp>
+    </p:spTree>
+    <p:extLst>
+      <p:ext uri="{BB962C8B-B14F-4D97-AF65-F5344CB8AC3E}">
+        <p14:creationId xmlns:p14="http://schemas.microsoft.com/office/powerpoint/2010/main" val="2879637664"/>
+      </p:ext>
+    </p:extLst>
+  </p:cSld>
+  <p:clrMapOvr>
+    <a:masterClrMapping/>
+  </p:clrMapOvr>
+</p:sld>
+</file>
+
+<file path=ppt/slides/slide7.xml><?xml version="1.0" encoding="utf-8"?>
+<p:sld xmlns:a="http://schemas.openxmlformats.org/drawingml/2006/main" xmlns:r="http://schemas.openxmlformats.org/officeDocument/2006/relationships" xmlns:p="http://schemas.openxmlformats.org/presentationml/2006/main">
+  <p:cSld>
+    <p:spTree>
+      <p:nvGrpSpPr>
+        <p:cNvPr id="1" name=""/>
+        <p:cNvGrpSpPr/>
+        <p:nvPr/>
+      </p:nvGrpSpPr>
+      <p:grpSpPr>
+        <a:xfrm>
+          <a:off x="0" y="0"/>
+          <a:ext cx="0" cy="0"/>
+          <a:chOff x="0" y="0"/>
+          <a:chExt cx="0" cy="0"/>
+        </a:xfrm>
+      </p:grpSpPr>
+      <p:sp>
+        <p:nvSpPr>
+          <p:cNvPr id="2" name="Title 1"/>
+          <p:cNvSpPr>
+            <a:spLocks noGrp="1"/>
+          </p:cNvSpPr>
+          <p:nvPr>
+            <p:ph type="title"/>
+          </p:nvPr>
+        </p:nvSpPr>
+        <p:spPr/>
+        <p:txBody>
+          <a:bodyPr vert="horz" lIns="91440" tIns="45720" rIns="91440" bIns="45720" rtlCol="0" anchor="ctr">
+            <a:normAutofit/>
+          </a:bodyPr>
+          <a:lstStyle/>
+          <a:p>
+            <a:r>
+              <a:rPr lang="en-US" dirty="0">
+                <a:solidFill>
+                  <a:srgbClr val="FF8000"/>
+                </a:solidFill>
+              </a:rPr>
               <a:t>Design choice</a:t>
             </a:r>
-            <a:endParaRPr lang="nl-NL" dirty="0"/>
+            <a:endParaRPr lang="nl-NL" dirty="0">
+              <a:solidFill>
+                <a:srgbClr val="FF8000"/>
+              </a:solidFill>
+            </a:endParaRPr>
           </a:p>
         </p:txBody>
       </p:sp>

</xml_diff>